<commit_message>
TXs -> TX, RXs -> RX 로 간략화
</commit_message>
<xml_diff>
--- a/DsDotNet/src/UnitTest/UnitTest.Model/ImportOfficeExample/ppt/T4_Api.pptx
+++ b/DsDotNet/src/UnitTest/UnitTest.Model/ImportOfficeExample/ppt/T4_Api.pptx
@@ -5,16 +5,15 @@
     <p:sldMasterId id="2147483660" r:id="rId1"/>
   </p:sldMasterIdLst>
   <p:notesMasterIdLst>
-    <p:notesMasterId r:id="rId6"/>
+    <p:notesMasterId r:id="rId5"/>
   </p:notesMasterIdLst>
   <p:handoutMasterIdLst>
-    <p:handoutMasterId r:id="rId7"/>
+    <p:handoutMasterId r:id="rId6"/>
   </p:handoutMasterIdLst>
   <p:sldIdLst>
     <p:sldId id="256" r:id="rId2"/>
     <p:sldId id="607" r:id="rId3"/>
     <p:sldId id="625" r:id="rId4"/>
-    <p:sldId id="617" r:id="rId5"/>
   </p:sldIdLst>
   <p:sldSz cx="12192000" cy="6858000"/>
   <p:notesSz cx="6797675" cy="9926638"/>
@@ -218,7 +217,7 @@
           <a:p>
             <a:fld id="{DD503887-5801-43A0-AEF9-041E8DDC2558}" type="datetimeFigureOut">
               <a:rPr lang="ko-KR" altLang="en-US" smtClean="0"/>
-              <a:t>2024-05-12</a:t>
+              <a:t>2024-06-13</a:t>
             </a:fld>
             <a:endParaRPr lang="ko-KR" altLang="en-US"/>
           </a:p>
@@ -395,7 +394,7 @@
           <a:p>
             <a:fld id="{95336A0E-57B1-4D4C-BD9B-2F72B5943464}" type="datetimeFigureOut">
               <a:rPr lang="ko-KR" altLang="en-US" smtClean="0"/>
-              <a:t>2024-05-12</a:t>
+              <a:t>2024-06-13</a:t>
             </a:fld>
             <a:endParaRPr lang="ko-KR" altLang="en-US"/>
           </a:p>
@@ -949,7 +948,7 @@
           <a:p>
             <a:fld id="{DEA6EBF0-8E22-42A7-9BEA-2AC7066E6498}" type="datetimeFigureOut">
               <a:rPr lang="ko-KR" altLang="en-US" smtClean="0"/>
-              <a:t>2024-05-12</a:t>
+              <a:t>2024-06-13</a:t>
             </a:fld>
             <a:endParaRPr lang="ko-KR" altLang="en-US"/>
           </a:p>
@@ -1267,7 +1266,7 @@
           <a:p>
             <a:fld id="{DEA6EBF0-8E22-42A7-9BEA-2AC7066E6498}" type="datetimeFigureOut">
               <a:rPr lang="ko-KR" altLang="en-US" smtClean="0"/>
-              <a:t>2024-05-12</a:t>
+              <a:t>2024-06-13</a:t>
             </a:fld>
             <a:endParaRPr lang="ko-KR" altLang="en-US"/>
           </a:p>
@@ -1755,7 +1754,7 @@
           <a:p>
             <a:fld id="{DEA6EBF0-8E22-42A7-9BEA-2AC7066E6498}" type="datetimeFigureOut">
               <a:rPr lang="ko-KR" altLang="en-US" smtClean="0"/>
-              <a:t>2024-05-12</a:t>
+              <a:t>2024-06-13</a:t>
             </a:fld>
             <a:endParaRPr lang="ko-KR" altLang="en-US"/>
           </a:p>
@@ -2124,7 +2123,7 @@
           <a:p>
             <a:fld id="{DEA6EBF0-8E22-42A7-9BEA-2AC7066E6498}" type="datetimeFigureOut">
               <a:rPr lang="ko-KR" altLang="en-US" smtClean="0"/>
-              <a:t>2024-05-12</a:t>
+              <a:t>2024-06-13</a:t>
             </a:fld>
             <a:endParaRPr lang="ko-KR" altLang="en-US"/>
           </a:p>
@@ -2397,7 +2396,7 @@
           <a:p>
             <a:fld id="{DEA6EBF0-8E22-42A7-9BEA-2AC7066E6498}" type="datetimeFigureOut">
               <a:rPr lang="ko-KR" altLang="en-US" smtClean="0"/>
-              <a:t>2024-05-12</a:t>
+              <a:t>2024-06-13</a:t>
             </a:fld>
             <a:endParaRPr lang="ko-KR" altLang="en-US"/>
           </a:p>
@@ -2682,7 +2681,7 @@
           <a:p>
             <a:fld id="{DEA6EBF0-8E22-42A7-9BEA-2AC7066E6498}" type="datetimeFigureOut">
               <a:rPr lang="ko-KR" altLang="en-US" smtClean="0"/>
-              <a:t>2024-05-12</a:t>
+              <a:t>2024-06-13</a:t>
             </a:fld>
             <a:endParaRPr lang="ko-KR" altLang="en-US"/>
           </a:p>
@@ -2800,7 +2799,7 @@
           <a:p>
             <a:fld id="{DEA6EBF0-8E22-42A7-9BEA-2AC7066E6498}" type="datetimeFigureOut">
               <a:rPr lang="ko-KR" altLang="en-US" smtClean="0"/>
-              <a:t>2024-05-12</a:t>
+              <a:t>2024-06-13</a:t>
             </a:fld>
             <a:endParaRPr lang="ko-KR" altLang="en-US"/>
           </a:p>
@@ -3083,7 +3082,7 @@
           <a:p>
             <a:fld id="{DEA6EBF0-8E22-42A7-9BEA-2AC7066E6498}" type="datetimeFigureOut">
               <a:rPr lang="ko-KR" altLang="en-US" smtClean="0"/>
-              <a:t>2024-05-12</a:t>
+              <a:t>2024-06-13</a:t>
             </a:fld>
             <a:endParaRPr lang="ko-KR" altLang="en-US"/>
           </a:p>
@@ -3426,7 +3425,7 @@
           <a:p>
             <a:fld id="{DEA6EBF0-8E22-42A7-9BEA-2AC7066E6498}" type="datetimeFigureOut">
               <a:rPr lang="ko-KR" altLang="en-US" smtClean="0"/>
-              <a:t>2024-05-12</a:t>
+              <a:t>2024-06-13</a:t>
             </a:fld>
             <a:endParaRPr lang="ko-KR" altLang="en-US"/>
           </a:p>
@@ -3765,7 +3764,7 @@
           <a:p>
             <a:fld id="{DEA6EBF0-8E22-42A7-9BEA-2AC7066E6498}" type="datetimeFigureOut">
               <a:rPr lang="ko-KR" altLang="en-US" smtClean="0"/>
-              <a:t>2024-05-12</a:t>
+              <a:t>2024-06-13</a:t>
             </a:fld>
             <a:endParaRPr lang="ko-KR" altLang="en-US"/>
           </a:p>
@@ -4242,7 +4241,7 @@
           <a:p>
             <a:fld id="{DEA6EBF0-8E22-42A7-9BEA-2AC7066E6498}" type="datetimeFigureOut">
               <a:rPr lang="ko-KR" altLang="en-US" smtClean="0"/>
-              <a:t>2024-05-12</a:t>
+              <a:t>2024-06-13</a:t>
             </a:fld>
             <a:endParaRPr lang="ko-KR" altLang="en-US"/>
           </a:p>
@@ -4337,7 +4336,7 @@
           <a:p>
             <a:fld id="{DEA6EBF0-8E22-42A7-9BEA-2AC7066E6498}" type="datetimeFigureOut">
               <a:rPr lang="ko-KR" altLang="en-US" smtClean="0"/>
-              <a:t>2024-05-12</a:t>
+              <a:t>2024-06-13</a:t>
             </a:fld>
             <a:endParaRPr lang="ko-KR" altLang="en-US"/>
           </a:p>
@@ -4804,7 +4803,7 @@
           <a:p>
             <a:fld id="{DEA6EBF0-8E22-42A7-9BEA-2AC7066E6498}" type="datetimeFigureOut">
               <a:rPr lang="ko-KR" altLang="en-US" smtClean="0"/>
-              <a:t>2024-05-12</a:t>
+              <a:t>2024-06-13</a:t>
             </a:fld>
             <a:endParaRPr lang="ko-KR" altLang="en-US"/>
           </a:p>
@@ -5117,7 +5116,7 @@
           <a:p>
             <a:fld id="{DEA6EBF0-8E22-42A7-9BEA-2AC7066E6498}" type="datetimeFigureOut">
               <a:rPr lang="ko-KR" altLang="en-US" smtClean="0"/>
-              <a:t>2024-05-12</a:t>
+              <a:t>2024-06-13</a:t>
             </a:fld>
             <a:endParaRPr lang="ko-KR" altLang="en-US"/>
           </a:p>
@@ -5387,7 +5386,7 @@
           <a:p>
             <a:fld id="{DEA6EBF0-8E22-42A7-9BEA-2AC7066E6498}" type="datetimeFigureOut">
               <a:rPr lang="ko-KR" altLang="en-US" smtClean="0"/>
-              <a:t>2024-05-12</a:t>
+              <a:t>2024-06-13</a:t>
             </a:fld>
             <a:endParaRPr lang="ko-KR" altLang="en-US"/>
           </a:p>
@@ -6762,7 +6761,7 @@
               <a:rPr lang="en-US" altLang="ko-KR" sz="1200" dirty="0">
                 <a:ea typeface="현대하모니 M" panose="02020603020101020101"/>
               </a:rPr>
-              <a:t>[R2 ~R2;R5]</a:t>
+              <a:t>[R2 ~R2]</a:t>
             </a:r>
             <a:endParaRPr lang="ko-KR" altLang="en-US" sz="1200" dirty="0">
               <a:ea typeface="현대하모니 M" panose="02020603020101020101"/>
@@ -6838,7 +6837,7 @@
               <a:rPr lang="en-US" altLang="ko-KR" sz="1200" dirty="0">
                 <a:ea typeface="현대하모니 M" panose="02020603020101020101"/>
               </a:rPr>
-              <a:t>[R1;R4~ R4]</a:t>
+              <a:t>[R1~ R4]</a:t>
             </a:r>
             <a:endParaRPr lang="ko-KR" altLang="en-US" sz="1200" dirty="0">
               <a:ea typeface="현대하모니 M" panose="02020603020101020101"/>
@@ -7402,800 +7401,6 @@
     <p:extLst>
       <p:ext uri="{BB962C8B-B14F-4D97-AF65-F5344CB8AC3E}">
         <p14:creationId xmlns:p14="http://schemas.microsoft.com/office/powerpoint/2010/main" val="232903512"/>
-      </p:ext>
-    </p:extLst>
-  </p:cSld>
-  <p:clrMapOvr>
-    <a:masterClrMapping/>
-  </p:clrMapOvr>
-</p:sld>
-</file>
-
-<file path=ppt/slides/slide4.xml><?xml version="1.0" encoding="utf-8"?>
-<p:sld xmlns:a="http://schemas.openxmlformats.org/drawingml/2006/main" xmlns:r="http://schemas.openxmlformats.org/officeDocument/2006/relationships" xmlns:p="http://schemas.openxmlformats.org/presentationml/2006/main" show="0">
-  <p:cSld>
-    <p:spTree>
-      <p:nvGrpSpPr>
-        <p:cNvPr id="1" name=""/>
-        <p:cNvGrpSpPr/>
-        <p:nvPr/>
-      </p:nvGrpSpPr>
-      <p:grpSpPr>
-        <a:xfrm>
-          <a:off x="0" y="0"/>
-          <a:ext cx="0" cy="0"/>
-          <a:chOff x="0" y="0"/>
-          <a:chExt cx="0" cy="0"/>
-        </a:xfrm>
-      </p:grpSpPr>
-      <p:sp>
-        <p:nvSpPr>
-          <p:cNvPr id="2" name="제목 1">
-            <a:extLst>
-              <a:ext uri="{FF2B5EF4-FFF2-40B4-BE49-F238E27FC236}">
-                <a16:creationId xmlns:a16="http://schemas.microsoft.com/office/drawing/2014/main" id="{5E8FE27E-4086-E570-1BA4-F2B433CAA376}"/>
-              </a:ext>
-            </a:extLst>
-          </p:cNvPr>
-          <p:cNvSpPr>
-            <a:spLocks noGrp="1"/>
-          </p:cNvSpPr>
-          <p:nvPr>
-            <p:ph type="title"/>
-          </p:nvPr>
-        </p:nvSpPr>
-        <p:spPr/>
-        <p:txBody>
-          <a:bodyPr/>
-          <a:lstStyle/>
-          <a:p>
-            <a:r>
-              <a:rPr lang="en-US" altLang="ko-KR" dirty="0"/>
-              <a:t>F3</a:t>
-            </a:r>
-            <a:endParaRPr lang="ko-KR" altLang="en-US" dirty="0"/>
-          </a:p>
-        </p:txBody>
-      </p:sp>
-      <p:sp>
-        <p:nvSpPr>
-          <p:cNvPr id="46" name="화살표: 오각형 45">
-            <a:extLst>
-              <a:ext uri="{FF2B5EF4-FFF2-40B4-BE49-F238E27FC236}">
-                <a16:creationId xmlns:a16="http://schemas.microsoft.com/office/drawing/2014/main" id="{4D5D549B-3E7B-5F89-4E8D-0371804CA678}"/>
-              </a:ext>
-            </a:extLst>
-          </p:cNvPr>
-          <p:cNvSpPr/>
-          <p:nvPr/>
-        </p:nvSpPr>
-        <p:spPr>
-          <a:xfrm flipH="1">
-            <a:off x="-564081" y="3119404"/>
-            <a:ext cx="1233582" cy="690024"/>
-          </a:xfrm>
-          <a:prstGeom prst="homePlate">
-            <a:avLst/>
-          </a:prstGeom>
-          <a:solidFill>
-            <a:srgbClr val="012F6B"/>
-          </a:solidFill>
-          <a:ln w="28575">
-            <a:solidFill>
-              <a:schemeClr val="accent6"/>
-            </a:solidFill>
-          </a:ln>
-        </p:spPr>
-        <p:style>
-          <a:lnRef idx="0">
-            <a:scrgbClr r="0" g="0" b="0"/>
-          </a:lnRef>
-          <a:fillRef idx="0">
-            <a:scrgbClr r="0" g="0" b="0"/>
-          </a:fillRef>
-          <a:effectRef idx="0">
-            <a:scrgbClr r="0" g="0" b="0"/>
-          </a:effectRef>
-          <a:fontRef idx="minor">
-            <a:schemeClr val="lt1"/>
-          </a:fontRef>
-        </p:style>
-        <p:txBody>
-          <a:bodyPr vert="horz" wrap="none" lIns="91440" tIns="45720" rIns="91440" bIns="45720" numCol="1" rtlCol="0" anchor="ctr" anchorCtr="0" compatLnSpc="1">
-            <a:prstTxWarp prst="textNoShape">
-              <a:avLst/>
-            </a:prstTxWarp>
-          </a:bodyPr>
-          <a:lstStyle/>
-          <a:p>
-            <a:pPr algn="ctr"/>
-            <a:r>
-              <a:rPr lang="en-US" altLang="ko-KR" sz="1200" dirty="0"/>
-              <a:t>API7</a:t>
-            </a:r>
-          </a:p>
-          <a:p>
-            <a:pPr algn="ctr"/>
-            <a:r>
-              <a:rPr lang="en-US" altLang="ko-KR" sz="1200" dirty="0"/>
-              <a:t>[R1~R2]</a:t>
-            </a:r>
-            <a:endParaRPr lang="ko-KR" altLang="en-US" sz="1200" dirty="0"/>
-          </a:p>
-        </p:txBody>
-      </p:sp>
-      <p:sp>
-        <p:nvSpPr>
-          <p:cNvPr id="47" name="화살표: 오각형 46">
-            <a:extLst>
-              <a:ext uri="{FF2B5EF4-FFF2-40B4-BE49-F238E27FC236}">
-                <a16:creationId xmlns:a16="http://schemas.microsoft.com/office/drawing/2014/main" id="{C4D5236B-A71B-1EE6-3D92-5C4A84BC554B}"/>
-              </a:ext>
-            </a:extLst>
-          </p:cNvPr>
-          <p:cNvSpPr/>
-          <p:nvPr/>
-        </p:nvSpPr>
-        <p:spPr>
-          <a:xfrm flipH="1">
-            <a:off x="-564082" y="3898882"/>
-            <a:ext cx="1233582" cy="690024"/>
-          </a:xfrm>
-          <a:prstGeom prst="homePlate">
-            <a:avLst/>
-          </a:prstGeom>
-          <a:solidFill>
-            <a:srgbClr val="012F6B"/>
-          </a:solidFill>
-          <a:ln w="28575">
-            <a:solidFill>
-              <a:schemeClr val="accent6"/>
-            </a:solidFill>
-          </a:ln>
-        </p:spPr>
-        <p:style>
-          <a:lnRef idx="0">
-            <a:scrgbClr r="0" g="0" b="0"/>
-          </a:lnRef>
-          <a:fillRef idx="0">
-            <a:scrgbClr r="0" g="0" b="0"/>
-          </a:fillRef>
-          <a:effectRef idx="0">
-            <a:scrgbClr r="0" g="0" b="0"/>
-          </a:effectRef>
-          <a:fontRef idx="minor">
-            <a:schemeClr val="lt1"/>
-          </a:fontRef>
-        </p:style>
-        <p:txBody>
-          <a:bodyPr vert="horz" wrap="none" lIns="91440" tIns="45720" rIns="91440" bIns="45720" numCol="1" rtlCol="0" anchor="ctr" anchorCtr="0" compatLnSpc="1">
-            <a:prstTxWarp prst="textNoShape">
-              <a:avLst/>
-            </a:prstTxWarp>
-          </a:bodyPr>
-          <a:lstStyle/>
-          <a:p>
-            <a:pPr algn="ctr"/>
-            <a:r>
-              <a:rPr lang="en-US" altLang="ko-KR" sz="1200" dirty="0"/>
-              <a:t>API8</a:t>
-            </a:r>
-          </a:p>
-          <a:p>
-            <a:pPr algn="ctr"/>
-            <a:r>
-              <a:rPr lang="en-US" altLang="ko-KR" sz="1200" dirty="0"/>
-              <a:t>[R1~R2]</a:t>
-            </a:r>
-            <a:endParaRPr lang="ko-KR" altLang="en-US" sz="1200" dirty="0"/>
-          </a:p>
-        </p:txBody>
-      </p:sp>
-      <p:cxnSp>
-        <p:nvCxnSpPr>
-          <p:cNvPr id="48" name="연결선: 꺾임 47">
-            <a:extLst>
-              <a:ext uri="{FF2B5EF4-FFF2-40B4-BE49-F238E27FC236}">
-                <a16:creationId xmlns:a16="http://schemas.microsoft.com/office/drawing/2014/main" id="{3ECD6C85-E1D9-7484-F92F-D6D4D97FCD08}"/>
-              </a:ext>
-            </a:extLst>
-          </p:cNvPr>
-          <p:cNvCxnSpPr>
-            <a:cxnSpLocks/>
-            <a:stCxn id="47" idx="1"/>
-            <a:endCxn id="46" idx="1"/>
-          </p:cNvCxnSpPr>
-          <p:nvPr/>
-        </p:nvCxnSpPr>
-        <p:spPr>
-          <a:xfrm flipV="1">
-            <a:off x="669500" y="3464416"/>
-            <a:ext cx="1" cy="779478"/>
-          </a:xfrm>
-          <a:prstGeom prst="bentConnector3">
-            <a:avLst>
-              <a:gd name="adj1" fmla="val 22860100000"/>
-            </a:avLst>
-          </a:prstGeom>
-          <a:ln w="28575">
-            <a:solidFill>
-              <a:srgbClr val="C00000"/>
-            </a:solidFill>
-            <a:prstDash val="dash"/>
-            <a:headEnd type="none" w="med" len="med"/>
-            <a:tailEnd type="triangle" w="med" len="med"/>
-          </a:ln>
-        </p:spPr>
-        <p:style>
-          <a:lnRef idx="1">
-            <a:schemeClr val="accent1"/>
-          </a:lnRef>
-          <a:fillRef idx="0">
-            <a:schemeClr val="accent1"/>
-          </a:fillRef>
-          <a:effectRef idx="0">
-            <a:schemeClr val="accent1"/>
-          </a:effectRef>
-          <a:fontRef idx="minor">
-            <a:schemeClr val="tx1"/>
-          </a:fontRef>
-        </p:style>
-      </p:cxnSp>
-      <p:sp>
-        <p:nvSpPr>
-          <p:cNvPr id="56" name="직사각형 55">
-            <a:extLst>
-              <a:ext uri="{FF2B5EF4-FFF2-40B4-BE49-F238E27FC236}">
-                <a16:creationId xmlns:a16="http://schemas.microsoft.com/office/drawing/2014/main" id="{B59930BF-EFE8-0861-D55E-FEAC7FD46A32}"/>
-              </a:ext>
-            </a:extLst>
-          </p:cNvPr>
-          <p:cNvSpPr/>
-          <p:nvPr/>
-        </p:nvSpPr>
-        <p:spPr>
-          <a:xfrm>
-            <a:off x="3367314" y="2548873"/>
-            <a:ext cx="1103086" cy="1066431"/>
-          </a:xfrm>
-          <a:prstGeom prst="rect">
-            <a:avLst/>
-          </a:prstGeom>
-          <a:solidFill>
-            <a:schemeClr val="accent4">
-              <a:alpha val="50000"/>
-            </a:schemeClr>
-          </a:solidFill>
-          <a:ln>
-            <a:noFill/>
-          </a:ln>
-        </p:spPr>
-        <p:style>
-          <a:lnRef idx="0">
-            <a:scrgbClr r="0" g="0" b="0"/>
-          </a:lnRef>
-          <a:fillRef idx="0">
-            <a:scrgbClr r="0" g="0" b="0"/>
-          </a:fillRef>
-          <a:effectRef idx="0">
-            <a:scrgbClr r="0" g="0" b="0"/>
-          </a:effectRef>
-          <a:fontRef idx="minor">
-            <a:schemeClr val="lt1"/>
-          </a:fontRef>
-        </p:style>
-        <p:txBody>
-          <a:bodyPr rtlCol="0" anchor="ctr"/>
-          <a:lstStyle/>
-          <a:p>
-            <a:pPr algn="ctr"/>
-            <a:r>
-              <a:rPr lang="en-US" altLang="ko-KR" sz="1200" dirty="0"/>
-              <a:t>R5</a:t>
-            </a:r>
-            <a:endParaRPr lang="ko-KR" altLang="en-US" sz="1200" dirty="0"/>
-          </a:p>
-        </p:txBody>
-      </p:sp>
-      <p:sp>
-        <p:nvSpPr>
-          <p:cNvPr id="57" name="직사각형 56">
-            <a:extLst>
-              <a:ext uri="{FF2B5EF4-FFF2-40B4-BE49-F238E27FC236}">
-                <a16:creationId xmlns:a16="http://schemas.microsoft.com/office/drawing/2014/main" id="{BC6400FF-5524-4038-3024-EDBA75033DA4}"/>
-              </a:ext>
-            </a:extLst>
-          </p:cNvPr>
-          <p:cNvSpPr/>
-          <p:nvPr/>
-        </p:nvSpPr>
-        <p:spPr>
-          <a:xfrm>
-            <a:off x="5152571" y="2548873"/>
-            <a:ext cx="1103086" cy="1066431"/>
-          </a:xfrm>
-          <a:prstGeom prst="rect">
-            <a:avLst/>
-          </a:prstGeom>
-          <a:solidFill>
-            <a:schemeClr val="accent4">
-              <a:alpha val="50000"/>
-            </a:schemeClr>
-          </a:solidFill>
-          <a:ln>
-            <a:noFill/>
-          </a:ln>
-        </p:spPr>
-        <p:style>
-          <a:lnRef idx="0">
-            <a:scrgbClr r="0" g="0" b="0"/>
-          </a:lnRef>
-          <a:fillRef idx="0">
-            <a:scrgbClr r="0" g="0" b="0"/>
-          </a:fillRef>
-          <a:effectRef idx="0">
-            <a:scrgbClr r="0" g="0" b="0"/>
-          </a:effectRef>
-          <a:fontRef idx="minor">
-            <a:schemeClr val="lt1"/>
-          </a:fontRef>
-        </p:style>
-        <p:txBody>
-          <a:bodyPr rtlCol="0" anchor="ctr"/>
-          <a:lstStyle/>
-          <a:p>
-            <a:pPr algn="ctr"/>
-            <a:r>
-              <a:rPr lang="en-US" altLang="ko-KR" sz="1200" dirty="0"/>
-              <a:t>R2</a:t>
-            </a:r>
-            <a:endParaRPr lang="ko-KR" altLang="en-US" sz="1200" dirty="0"/>
-          </a:p>
-        </p:txBody>
-      </p:sp>
-      <p:sp>
-        <p:nvSpPr>
-          <p:cNvPr id="58" name="직사각형 57">
-            <a:extLst>
-              <a:ext uri="{FF2B5EF4-FFF2-40B4-BE49-F238E27FC236}">
-                <a16:creationId xmlns:a16="http://schemas.microsoft.com/office/drawing/2014/main" id="{AC60E36D-ED89-20DC-649C-AC6A71988D99}"/>
-              </a:ext>
-            </a:extLst>
-          </p:cNvPr>
-          <p:cNvSpPr/>
-          <p:nvPr/>
-        </p:nvSpPr>
-        <p:spPr>
-          <a:xfrm>
-            <a:off x="6937828" y="2548873"/>
-            <a:ext cx="1103086" cy="1066431"/>
-          </a:xfrm>
-          <a:prstGeom prst="rect">
-            <a:avLst/>
-          </a:prstGeom>
-          <a:solidFill>
-            <a:schemeClr val="accent4">
-              <a:alpha val="50000"/>
-            </a:schemeClr>
-          </a:solidFill>
-          <a:ln>
-            <a:noFill/>
-          </a:ln>
-        </p:spPr>
-        <p:style>
-          <a:lnRef idx="0">
-            <a:scrgbClr r="0" g="0" b="0"/>
-          </a:lnRef>
-          <a:fillRef idx="0">
-            <a:scrgbClr r="0" g="0" b="0"/>
-          </a:fillRef>
-          <a:effectRef idx="0">
-            <a:scrgbClr r="0" g="0" b="0"/>
-          </a:effectRef>
-          <a:fontRef idx="minor">
-            <a:schemeClr val="lt1"/>
-          </a:fontRef>
-        </p:style>
-        <p:txBody>
-          <a:bodyPr rtlCol="0" anchor="ctr"/>
-          <a:lstStyle/>
-          <a:p>
-            <a:pPr algn="ctr"/>
-            <a:r>
-              <a:rPr lang="en-US" altLang="ko-KR" sz="1200" dirty="0"/>
-              <a:t>R3</a:t>
-            </a:r>
-            <a:endParaRPr lang="ko-KR" altLang="en-US" sz="1200" dirty="0"/>
-          </a:p>
-        </p:txBody>
-      </p:sp>
-      <p:cxnSp>
-        <p:nvCxnSpPr>
-          <p:cNvPr id="60" name="직선 화살표 연결선 59">
-            <a:extLst>
-              <a:ext uri="{FF2B5EF4-FFF2-40B4-BE49-F238E27FC236}">
-                <a16:creationId xmlns:a16="http://schemas.microsoft.com/office/drawing/2014/main" id="{212CABAB-11EC-E692-772C-DCB98D8A7446}"/>
-              </a:ext>
-            </a:extLst>
-          </p:cNvPr>
-          <p:cNvCxnSpPr>
-            <a:stCxn id="56" idx="3"/>
-            <a:endCxn id="57" idx="1"/>
-          </p:cNvCxnSpPr>
-          <p:nvPr/>
-        </p:nvCxnSpPr>
-        <p:spPr>
-          <a:xfrm>
-            <a:off x="4470400" y="3082089"/>
-            <a:ext cx="682171" cy="0"/>
-          </a:xfrm>
-          <a:prstGeom prst="straightConnector1">
-            <a:avLst/>
-          </a:prstGeom>
-          <a:ln>
-            <a:tailEnd type="triangle"/>
-          </a:ln>
-        </p:spPr>
-        <p:style>
-          <a:lnRef idx="1">
-            <a:schemeClr val="accent1"/>
-          </a:lnRef>
-          <a:fillRef idx="0">
-            <a:schemeClr val="accent1"/>
-          </a:fillRef>
-          <a:effectRef idx="0">
-            <a:schemeClr val="accent1"/>
-          </a:effectRef>
-          <a:fontRef idx="minor">
-            <a:schemeClr val="tx1"/>
-          </a:fontRef>
-        </p:style>
-      </p:cxnSp>
-      <p:cxnSp>
-        <p:nvCxnSpPr>
-          <p:cNvPr id="61" name="직선 화살표 연결선 60">
-            <a:extLst>
-              <a:ext uri="{FF2B5EF4-FFF2-40B4-BE49-F238E27FC236}">
-                <a16:creationId xmlns:a16="http://schemas.microsoft.com/office/drawing/2014/main" id="{3DD5BD68-5DED-63DC-6E32-E19170A965EF}"/>
-              </a:ext>
-            </a:extLst>
-          </p:cNvPr>
-          <p:cNvCxnSpPr>
-            <a:cxnSpLocks/>
-            <a:stCxn id="57" idx="3"/>
-            <a:endCxn id="58" idx="1"/>
-          </p:cNvCxnSpPr>
-          <p:nvPr/>
-        </p:nvCxnSpPr>
-        <p:spPr>
-          <a:xfrm>
-            <a:off x="6255657" y="3082089"/>
-            <a:ext cx="682171" cy="0"/>
-          </a:xfrm>
-          <a:prstGeom prst="straightConnector1">
-            <a:avLst/>
-          </a:prstGeom>
-          <a:ln>
-            <a:tailEnd type="triangle"/>
-          </a:ln>
-        </p:spPr>
-        <p:style>
-          <a:lnRef idx="1">
-            <a:schemeClr val="accent1"/>
-          </a:lnRef>
-          <a:fillRef idx="0">
-            <a:schemeClr val="accent1"/>
-          </a:fillRef>
-          <a:effectRef idx="0">
-            <a:schemeClr val="accent1"/>
-          </a:effectRef>
-          <a:fontRef idx="minor">
-            <a:schemeClr val="tx1"/>
-          </a:fontRef>
-        </p:style>
-      </p:cxnSp>
-      <p:sp>
-        <p:nvSpPr>
-          <p:cNvPr id="67" name="직사각형 66">
-            <a:extLst>
-              <a:ext uri="{FF2B5EF4-FFF2-40B4-BE49-F238E27FC236}">
-                <a16:creationId xmlns:a16="http://schemas.microsoft.com/office/drawing/2014/main" id="{6CD07698-261E-1C80-B0B9-45488C6F0EF0}"/>
-              </a:ext>
-            </a:extLst>
-          </p:cNvPr>
-          <p:cNvSpPr/>
-          <p:nvPr/>
-        </p:nvSpPr>
-        <p:spPr>
-          <a:xfrm>
-            <a:off x="4310743" y="4705300"/>
-            <a:ext cx="1103086" cy="1066431"/>
-          </a:xfrm>
-          <a:prstGeom prst="rect">
-            <a:avLst/>
-          </a:prstGeom>
-          <a:solidFill>
-            <a:schemeClr val="accent4">
-              <a:alpha val="50000"/>
-            </a:schemeClr>
-          </a:solidFill>
-          <a:ln>
-            <a:noFill/>
-          </a:ln>
-        </p:spPr>
-        <p:style>
-          <a:lnRef idx="0">
-            <a:scrgbClr r="0" g="0" b="0"/>
-          </a:lnRef>
-          <a:fillRef idx="0">
-            <a:scrgbClr r="0" g="0" b="0"/>
-          </a:fillRef>
-          <a:effectRef idx="0">
-            <a:scrgbClr r="0" g="0" b="0"/>
-          </a:effectRef>
-          <a:fontRef idx="minor">
-            <a:schemeClr val="lt1"/>
-          </a:fontRef>
-        </p:style>
-        <p:txBody>
-          <a:bodyPr rtlCol="0" anchor="ctr"/>
-          <a:lstStyle/>
-          <a:p>
-            <a:pPr algn="ctr"/>
-            <a:r>
-              <a:rPr lang="en-US" altLang="ko-KR" sz="1200" dirty="0"/>
-              <a:t>R4</a:t>
-            </a:r>
-            <a:endParaRPr lang="ko-KR" altLang="en-US" sz="1200" dirty="0"/>
-          </a:p>
-        </p:txBody>
-      </p:sp>
-      <p:sp>
-        <p:nvSpPr>
-          <p:cNvPr id="68" name="직사각형 67">
-            <a:extLst>
-              <a:ext uri="{FF2B5EF4-FFF2-40B4-BE49-F238E27FC236}">
-                <a16:creationId xmlns:a16="http://schemas.microsoft.com/office/drawing/2014/main" id="{B94BB7DD-A7A7-F819-BF18-8F8A7E87882F}"/>
-              </a:ext>
-            </a:extLst>
-          </p:cNvPr>
-          <p:cNvSpPr/>
-          <p:nvPr/>
-        </p:nvSpPr>
-        <p:spPr>
-          <a:xfrm>
-            <a:off x="6096000" y="4705300"/>
-            <a:ext cx="1103086" cy="1066431"/>
-          </a:xfrm>
-          <a:prstGeom prst="rect">
-            <a:avLst/>
-          </a:prstGeom>
-          <a:solidFill>
-            <a:schemeClr val="accent4">
-              <a:alpha val="50000"/>
-            </a:schemeClr>
-          </a:solidFill>
-          <a:ln>
-            <a:noFill/>
-          </a:ln>
-        </p:spPr>
-        <p:style>
-          <a:lnRef idx="0">
-            <a:scrgbClr r="0" g="0" b="0"/>
-          </a:lnRef>
-          <a:fillRef idx="0">
-            <a:scrgbClr r="0" g="0" b="0"/>
-          </a:fillRef>
-          <a:effectRef idx="0">
-            <a:scrgbClr r="0" g="0" b="0"/>
-          </a:effectRef>
-          <a:fontRef idx="minor">
-            <a:schemeClr val="lt1"/>
-          </a:fontRef>
-        </p:style>
-        <p:txBody>
-          <a:bodyPr rtlCol="0" anchor="ctr"/>
-          <a:lstStyle/>
-          <a:p>
-            <a:pPr algn="ctr"/>
-            <a:r>
-              <a:rPr lang="en-US" altLang="ko-KR" sz="1200" dirty="0"/>
-              <a:t>R5</a:t>
-            </a:r>
-            <a:endParaRPr lang="ko-KR" altLang="en-US" sz="1200" dirty="0"/>
-          </a:p>
-        </p:txBody>
-      </p:sp>
-      <p:sp>
-        <p:nvSpPr>
-          <p:cNvPr id="69" name="직사각형 68">
-            <a:extLst>
-              <a:ext uri="{FF2B5EF4-FFF2-40B4-BE49-F238E27FC236}">
-                <a16:creationId xmlns:a16="http://schemas.microsoft.com/office/drawing/2014/main" id="{E6BDE77E-6A37-11C1-D34D-AD3171D69A07}"/>
-              </a:ext>
-            </a:extLst>
-          </p:cNvPr>
-          <p:cNvSpPr/>
-          <p:nvPr/>
-        </p:nvSpPr>
-        <p:spPr>
-          <a:xfrm>
-            <a:off x="7881257" y="4705300"/>
-            <a:ext cx="1103086" cy="1066431"/>
-          </a:xfrm>
-          <a:prstGeom prst="rect">
-            <a:avLst/>
-          </a:prstGeom>
-          <a:solidFill>
-            <a:schemeClr val="accent4">
-              <a:alpha val="50000"/>
-            </a:schemeClr>
-          </a:solidFill>
-          <a:ln>
-            <a:noFill/>
-          </a:ln>
-        </p:spPr>
-        <p:style>
-          <a:lnRef idx="0">
-            <a:scrgbClr r="0" g="0" b="0"/>
-          </a:lnRef>
-          <a:fillRef idx="0">
-            <a:scrgbClr r="0" g="0" b="0"/>
-          </a:fillRef>
-          <a:effectRef idx="0">
-            <a:scrgbClr r="0" g="0" b="0"/>
-          </a:effectRef>
-          <a:fontRef idx="minor">
-            <a:schemeClr val="lt1"/>
-          </a:fontRef>
-        </p:style>
-        <p:txBody>
-          <a:bodyPr rtlCol="0" anchor="ctr"/>
-          <a:lstStyle/>
-          <a:p>
-            <a:pPr algn="ctr"/>
-            <a:r>
-              <a:rPr lang="en-US" altLang="ko-KR" sz="1200" dirty="0"/>
-              <a:t>R6</a:t>
-            </a:r>
-            <a:endParaRPr lang="ko-KR" altLang="en-US" sz="1200" dirty="0"/>
-          </a:p>
-        </p:txBody>
-      </p:sp>
-      <p:cxnSp>
-        <p:nvCxnSpPr>
-          <p:cNvPr id="70" name="직선 화살표 연결선 69">
-            <a:extLst>
-              <a:ext uri="{FF2B5EF4-FFF2-40B4-BE49-F238E27FC236}">
-                <a16:creationId xmlns:a16="http://schemas.microsoft.com/office/drawing/2014/main" id="{624AE606-11A5-F72E-34D2-5DFDEE5E8C33}"/>
-              </a:ext>
-            </a:extLst>
-          </p:cNvPr>
-          <p:cNvCxnSpPr>
-            <a:stCxn id="67" idx="3"/>
-            <a:endCxn id="68" idx="1"/>
-          </p:cNvCxnSpPr>
-          <p:nvPr/>
-        </p:nvCxnSpPr>
-        <p:spPr>
-          <a:xfrm>
-            <a:off x="5413829" y="5238516"/>
-            <a:ext cx="682171" cy="0"/>
-          </a:xfrm>
-          <a:prstGeom prst="straightConnector1">
-            <a:avLst/>
-          </a:prstGeom>
-          <a:ln>
-            <a:tailEnd type="triangle"/>
-          </a:ln>
-        </p:spPr>
-        <p:style>
-          <a:lnRef idx="1">
-            <a:schemeClr val="accent1"/>
-          </a:lnRef>
-          <a:fillRef idx="0">
-            <a:schemeClr val="accent1"/>
-          </a:fillRef>
-          <a:effectRef idx="0">
-            <a:schemeClr val="accent1"/>
-          </a:effectRef>
-          <a:fontRef idx="minor">
-            <a:schemeClr val="tx1"/>
-          </a:fontRef>
-        </p:style>
-      </p:cxnSp>
-      <p:cxnSp>
-        <p:nvCxnSpPr>
-          <p:cNvPr id="71" name="직선 화살표 연결선 70">
-            <a:extLst>
-              <a:ext uri="{FF2B5EF4-FFF2-40B4-BE49-F238E27FC236}">
-                <a16:creationId xmlns:a16="http://schemas.microsoft.com/office/drawing/2014/main" id="{2D3C963E-2D9B-C387-0BCA-7F22ACDF94D2}"/>
-              </a:ext>
-            </a:extLst>
-          </p:cNvPr>
-          <p:cNvCxnSpPr>
-            <a:cxnSpLocks/>
-            <a:stCxn id="68" idx="3"/>
-            <a:endCxn id="69" idx="1"/>
-          </p:cNvCxnSpPr>
-          <p:nvPr/>
-        </p:nvCxnSpPr>
-        <p:spPr>
-          <a:xfrm>
-            <a:off x="7199086" y="5238516"/>
-            <a:ext cx="682171" cy="0"/>
-          </a:xfrm>
-          <a:prstGeom prst="straightConnector1">
-            <a:avLst/>
-          </a:prstGeom>
-          <a:ln>
-            <a:tailEnd type="triangle"/>
-          </a:ln>
-        </p:spPr>
-        <p:style>
-          <a:lnRef idx="1">
-            <a:schemeClr val="accent1"/>
-          </a:lnRef>
-          <a:fillRef idx="0">
-            <a:schemeClr val="accent1"/>
-          </a:fillRef>
-          <a:effectRef idx="0">
-            <a:schemeClr val="accent1"/>
-          </a:effectRef>
-          <a:fontRef idx="minor">
-            <a:schemeClr val="tx1"/>
-          </a:fontRef>
-        </p:style>
-      </p:cxnSp>
-      <p:sp>
-        <p:nvSpPr>
-          <p:cNvPr id="75" name="TextBox 74">
-            <a:extLst>
-              <a:ext uri="{FF2B5EF4-FFF2-40B4-BE49-F238E27FC236}">
-                <a16:creationId xmlns:a16="http://schemas.microsoft.com/office/drawing/2014/main" id="{78F6A213-7319-EAD5-7465-962C0B22F8AE}"/>
-              </a:ext>
-            </a:extLst>
-          </p:cNvPr>
-          <p:cNvSpPr txBox="1"/>
-          <p:nvPr/>
-        </p:nvSpPr>
-        <p:spPr>
-          <a:xfrm>
-            <a:off x="838200" y="3520209"/>
-            <a:ext cx="4444092" cy="923330"/>
-          </a:xfrm>
-          <a:prstGeom prst="rect">
-            <a:avLst/>
-          </a:prstGeom>
-          <a:noFill/>
-        </p:spPr>
-        <p:txBody>
-          <a:bodyPr wrap="square" rtlCol="0">
-            <a:spAutoFit/>
-          </a:bodyPr>
-          <a:lstStyle/>
-          <a:p>
-            <a:r>
-              <a:rPr lang="ko-KR" altLang="en-US" sz="1800" dirty="0"/>
-              <a:t>인터페이스 인과는 </a:t>
-            </a:r>
-            <a:endParaRPr lang="en-US" altLang="ko-KR" sz="1800" dirty="0"/>
-          </a:p>
-          <a:p>
-            <a:r>
-              <a:rPr lang="ko-KR" altLang="en-US" sz="1800" dirty="0"/>
-              <a:t>약 리셋 불가</a:t>
-            </a:r>
-          </a:p>
-          <a:p>
-            <a:endParaRPr lang="ko-KR" altLang="en-US" dirty="0"/>
-          </a:p>
-        </p:txBody>
-      </p:sp>
-    </p:spTree>
-    <p:extLst>
-      <p:ext uri="{BB962C8B-B14F-4D97-AF65-F5344CB8AC3E}">
-        <p14:creationId xmlns:p14="http://schemas.microsoft.com/office/powerpoint/2010/main" val="2425274170"/>
       </p:ext>
     </p:extLst>
   </p:cSld>

</xml_diff>